<commit_message>
first pass and forumation and baseline slides
</commit_message>
<xml_diff>
--- a/03 - Data Exploration, Analytical Formulation, and Baselines/formulation-and-baselines.pptx
+++ b/03 - Data Exploration, Analytical Formulation, and Baselines/formulation-and-baselines.pptx
@@ -5,15 +5,19 @@
     <p:sldMasterId id="2147483648" r:id="rId1"/>
   </p:sldMasterIdLst>
   <p:notesMasterIdLst>
-    <p:notesMasterId r:id="rId8"/>
+    <p:notesMasterId r:id="rId12"/>
   </p:notesMasterIdLst>
   <p:sldIdLst>
     <p:sldId id="256" r:id="rId2"/>
-    <p:sldId id="417" r:id="rId3"/>
-    <p:sldId id="424" r:id="rId4"/>
+    <p:sldId id="424" r:id="rId3"/>
+    <p:sldId id="430" r:id="rId4"/>
     <p:sldId id="425" r:id="rId5"/>
-    <p:sldId id="428" r:id="rId6"/>
-    <p:sldId id="427" r:id="rId7"/>
+    <p:sldId id="429" r:id="rId6"/>
+    <p:sldId id="428" r:id="rId7"/>
+    <p:sldId id="427" r:id="rId8"/>
+    <p:sldId id="432" r:id="rId9"/>
+    <p:sldId id="431" r:id="rId10"/>
+    <p:sldId id="433" r:id="rId11"/>
   </p:sldIdLst>
   <p:sldSz cx="12192000" cy="6858000"/>
   <p:notesSz cx="6858000" cy="9144000"/>
@@ -251,7 +255,7 @@
       <p15:sldGuideLst xmlns:p15="http://schemas.microsoft.com/office/powerpoint/2012/main"/>
     </p:ext>
     <p:ext uri="http://customooxmlschemas.google.com/">
-      <go:slidesCustomData xmlns:go="http://customooxmlschemas.google.com/" xmlns:p15="http://schemas.microsoft.com/office/powerpoint/2012/main" xmlns:p14="http://schemas.microsoft.com/office/powerpoint/2010/main" xmlns:com="http://schemas.openxmlformats.org/drawingml/2006/compatibility" xmlns:pvml="urn:schemas-microsoft-com:office:powerpoint" xmlns:v="urn:schemas-microsoft-com:vml" xmlns:o="urn:schemas-microsoft-com:office:office" xmlns:dgm="http://schemas.openxmlformats.org/drawingml/2006/diagram" xmlns:c="http://schemas.openxmlformats.org/drawingml/2006/chart" xmlns:mv="urn:schemas-microsoft-com:mac:vml" xmlns:mc="http://schemas.openxmlformats.org/markup-compatibility/2006" xmlns="" r:id="rId30" roundtripDataSignature="AMtx7mjFyVUGRZWio+dc9dxzYsimUxNJbg=="/>
+      <go:slidesCustomData xmlns="" xmlns:mc="http://schemas.openxmlformats.org/markup-compatibility/2006" xmlns:mv="urn:schemas-microsoft-com:mac:vml" xmlns:c="http://schemas.openxmlformats.org/drawingml/2006/chart" xmlns:dgm="http://schemas.openxmlformats.org/drawingml/2006/diagram" xmlns:o="urn:schemas-microsoft-com:office:office" xmlns:v="urn:schemas-microsoft-com:vml" xmlns:pvml="urn:schemas-microsoft-com:office:powerpoint" xmlns:com="http://schemas.openxmlformats.org/drawingml/2006/compatibility" xmlns:p14="http://schemas.microsoft.com/office/powerpoint/2010/main" xmlns:p15="http://schemas.microsoft.com/office/powerpoint/2012/main" xmlns:go="http://customooxmlschemas.google.com/" r:id="rId30" roundtripDataSignature="AMtx7mjFyVUGRZWio+dc9dxzYsimUxNJbg=="/>
     </p:ext>
   </p:extLst>
 </p:presentation>
@@ -3764,6 +3768,89 @@
 </p:sld>
 </file>
 
+<file path=ppt/slides/slide10.xml><?xml version="1.0" encoding="utf-8"?>
+<p:sld xmlns:a="http://schemas.openxmlformats.org/drawingml/2006/main" xmlns:r="http://schemas.openxmlformats.org/officeDocument/2006/relationships" xmlns:p="http://schemas.openxmlformats.org/presentationml/2006/main">
+  <p:cSld>
+    <p:spTree>
+      <p:nvGrpSpPr>
+        <p:cNvPr id="1" name=""/>
+        <p:cNvGrpSpPr/>
+        <p:nvPr/>
+      </p:nvGrpSpPr>
+      <p:grpSpPr>
+        <a:xfrm>
+          <a:off x="0" y="0"/>
+          <a:ext cx="0" cy="0"/>
+          <a:chOff x="0" y="0"/>
+          <a:chExt cx="0" cy="0"/>
+        </a:xfrm>
+      </p:grpSpPr>
+      <p:sp>
+        <p:nvSpPr>
+          <p:cNvPr id="2" name="Text Placeholder 1">
+            <a:extLst>
+              <a:ext uri="{FF2B5EF4-FFF2-40B4-BE49-F238E27FC236}">
+                <a16:creationId xmlns:a16="http://schemas.microsoft.com/office/drawing/2014/main" id="{853D6B69-44D2-D449-B9CE-63D5E2BFE8A0}"/>
+              </a:ext>
+            </a:extLst>
+          </p:cNvPr>
+          <p:cNvSpPr>
+            <a:spLocks noGrp="1"/>
+          </p:cNvSpPr>
+          <p:nvPr>
+            <p:ph type="body" idx="1"/>
+          </p:nvPr>
+        </p:nvSpPr>
+        <p:spPr/>
+        <p:txBody>
+          <a:bodyPr/>
+          <a:lstStyle/>
+          <a:p>
+            <a:endParaRPr lang="en-US"/>
+          </a:p>
+        </p:txBody>
+      </p:sp>
+      <p:sp>
+        <p:nvSpPr>
+          <p:cNvPr id="3" name="Title 2">
+            <a:extLst>
+              <a:ext uri="{FF2B5EF4-FFF2-40B4-BE49-F238E27FC236}">
+                <a16:creationId xmlns:a16="http://schemas.microsoft.com/office/drawing/2014/main" id="{D3765B02-360A-1F41-913A-E71E561203CC}"/>
+              </a:ext>
+            </a:extLst>
+          </p:cNvPr>
+          <p:cNvSpPr>
+            <a:spLocks noGrp="1"/>
+          </p:cNvSpPr>
+          <p:nvPr>
+            <p:ph type="title"/>
+          </p:nvPr>
+        </p:nvSpPr>
+        <p:spPr/>
+        <p:txBody>
+          <a:bodyPr/>
+          <a:lstStyle/>
+          <a:p>
+            <a:r>
+              <a:rPr lang="en-US" dirty="0"/>
+              <a:t>Baseline Examples</a:t>
+            </a:r>
+          </a:p>
+        </p:txBody>
+      </p:sp>
+    </p:spTree>
+    <p:extLst>
+      <p:ext uri="{BB962C8B-B14F-4D97-AF65-F5344CB8AC3E}">
+        <p14:creationId xmlns:p14="http://schemas.microsoft.com/office/powerpoint/2010/main" val="4120948450"/>
+      </p:ext>
+    </p:extLst>
+  </p:cSld>
+  <p:clrMapOvr>
+    <a:masterClrMapping/>
+  </p:clrMapOvr>
+</p:sld>
+</file>
+
 <file path=ppt/slides/slide2.xml><?xml version="1.0" encoding="utf-8"?>
 <p:sld xmlns:a="http://schemas.openxmlformats.org/drawingml/2006/main" xmlns:r="http://schemas.openxmlformats.org/officeDocument/2006/relationships" xmlns:p="http://schemas.openxmlformats.org/presentationml/2006/main">
   <p:cSld>
@@ -3783,7 +3870,13 @@
       </p:grpSpPr>
       <p:sp>
         <p:nvSpPr>
-          <p:cNvPr id="2" name="Content Placeholder 1"/>
+          <p:cNvPr id="2" name="Text Placeholder 1">
+            <a:extLst>
+              <a:ext uri="{FF2B5EF4-FFF2-40B4-BE49-F238E27FC236}">
+                <a16:creationId xmlns:a16="http://schemas.microsoft.com/office/drawing/2014/main" id="{4F90177E-EDBA-BC41-B606-574933A1A307}"/>
+              </a:ext>
+            </a:extLst>
+          </p:cNvPr>
           <p:cNvSpPr>
             <a:spLocks noGrp="1"/>
           </p:cNvSpPr>
@@ -3798,32 +3891,52 @@
           <a:p>
             <a:r>
               <a:rPr lang="en-US" dirty="0"/>
-              <a:t>Team Updates</a:t>
+              <a:t>Scoping defines the goals and approach at a high level, the </a:t>
             </a:r>
-          </a:p>
-          <a:p>
+            <a:r>
+              <a:rPr lang="en-US" b="1" dirty="0">
+                <a:solidFill>
+                  <a:srgbClr val="C00000"/>
+                </a:solidFill>
+              </a:rPr>
+              <a:t>analytical formulation </a:t>
+            </a:r>
             <a:r>
               <a:rPr lang="en-US" dirty="0"/>
-              <a:t>Finish up Pipelines</a:t>
+              <a:t>maps this scope to an ML problem and analytical approach</a:t>
             </a:r>
+            <a:br>
+              <a:rPr lang="en-US" dirty="0"/>
+            </a:br>
+            <a:endParaRPr lang="en-US" dirty="0"/>
           </a:p>
           <a:p>
             <a:r>
               <a:rPr lang="en-US" dirty="0"/>
-              <a:t>Analytical/ML Formulation</a:t>
+              <a:t>Should be as detailed and specific as possible, obvious how to code it up</a:t>
             </a:r>
+            <a:br>
+              <a:rPr lang="en-US" dirty="0"/>
+            </a:br>
+            <a:endParaRPr lang="en-US" dirty="0"/>
           </a:p>
           <a:p>
             <a:r>
               <a:rPr lang="en-US" dirty="0"/>
-              <a:t>Baselines</a:t>
+              <a:t>The analytical formulation should be guided by –– and map back to –– how the system you’re building will actually be deployed and used</a:t>
             </a:r>
           </a:p>
         </p:txBody>
       </p:sp>
       <p:sp>
         <p:nvSpPr>
-          <p:cNvPr id="3" name="Title 2"/>
+          <p:cNvPr id="3" name="Title 2">
+            <a:extLst>
+              <a:ext uri="{FF2B5EF4-FFF2-40B4-BE49-F238E27FC236}">
+                <a16:creationId xmlns:a16="http://schemas.microsoft.com/office/drawing/2014/main" id="{FC4F2F47-A164-2C41-A1CD-CFD1AFCBE708}"/>
+              </a:ext>
+            </a:extLst>
+          </p:cNvPr>
           <p:cNvSpPr>
             <a:spLocks noGrp="1"/>
           </p:cNvSpPr>
@@ -3831,23 +3944,14 @@
             <p:ph type="title"/>
           </p:nvPr>
         </p:nvSpPr>
-        <p:spPr>
-          <a:xfrm>
-            <a:off x="0" y="325028"/>
-            <a:ext cx="12192000" cy="1143000"/>
-          </a:xfrm>
-        </p:spPr>
+        <p:spPr/>
         <p:txBody>
           <a:bodyPr/>
           <a:lstStyle/>
           <a:p>
             <a:r>
-              <a:rPr lang="en-US" dirty="0">
-                <a:solidFill>
-                  <a:schemeClr val="bg1"/>
-                </a:solidFill>
-              </a:rPr>
-              <a:t>Things we will cover</a:t>
+              <a:rPr lang="en-US" dirty="0"/>
+              <a:t>Turning the project goals/scope into an ML problem</a:t>
             </a:r>
           </a:p>
         </p:txBody>
@@ -3855,7 +3959,7 @@
     </p:spTree>
     <p:extLst>
       <p:ext uri="{BB962C8B-B14F-4D97-AF65-F5344CB8AC3E}">
-        <p14:creationId xmlns:p14="http://schemas.microsoft.com/office/powerpoint/2010/main" val="2729631539"/>
+        <p14:creationId xmlns:p14="http://schemas.microsoft.com/office/powerpoint/2010/main" val="3562142687"/>
       </p:ext>
     </p:extLst>
   </p:cSld>
@@ -3905,13 +4009,37 @@
           <a:p>
             <a:r>
               <a:rPr lang="en-US" dirty="0"/>
-              <a:t>Example from readings</a:t>
+              <a:t>What type of analysis are you doing?</a:t>
             </a:r>
+            <a:br>
+              <a:rPr lang="en-US" dirty="0"/>
+            </a:br>
+            <a:endParaRPr lang="en-US" dirty="0"/>
           </a:p>
           <a:p>
             <a:r>
               <a:rPr lang="en-US" dirty="0"/>
-              <a:t>Class Projects</a:t>
+              <a:t>What are the relevant entities? How do you identify the cohort?</a:t>
+            </a:r>
+            <a:br>
+              <a:rPr lang="en-US" dirty="0"/>
+            </a:br>
+            <a:endParaRPr lang="en-US" dirty="0"/>
+          </a:p>
+          <a:p>
+            <a:r>
+              <a:rPr lang="en-US" dirty="0"/>
+              <a:t>How do you define the outcome/label that you care about?</a:t>
+            </a:r>
+            <a:br>
+              <a:rPr lang="en-US" dirty="0"/>
+            </a:br>
+            <a:endParaRPr lang="en-US" dirty="0"/>
+          </a:p>
+          <a:p>
+            <a:r>
+              <a:rPr lang="en-US" dirty="0"/>
+              <a:t>How far into the future are you trying to predict?</a:t>
             </a:r>
           </a:p>
         </p:txBody>
@@ -3939,7 +4067,7 @@
           <a:p>
             <a:r>
               <a:rPr lang="en-US" dirty="0"/>
-              <a:t>Turning the project goals/scope into an ML problem</a:t>
+              <a:t>Decisions we need to make</a:t>
             </a:r>
           </a:p>
         </p:txBody>
@@ -3947,7 +4075,7 @@
     </p:spTree>
     <p:extLst>
       <p:ext uri="{BB962C8B-B14F-4D97-AF65-F5344CB8AC3E}">
-        <p14:creationId xmlns:p14="http://schemas.microsoft.com/office/powerpoint/2010/main" val="3562142687"/>
+        <p14:creationId xmlns:p14="http://schemas.microsoft.com/office/powerpoint/2010/main" val="3163189124"/>
       </p:ext>
     </p:extLst>
   </p:cSld>
@@ -4055,7 +4183,7 @@
           <a:p>
             <a:r>
               <a:rPr lang="en-US" dirty="0"/>
-              <a:t>Decisions we need to make</a:t>
+              <a:t>Decisions we need to make: analytical approach</a:t>
             </a:r>
           </a:p>
         </p:txBody>
@@ -4095,6 +4223,126 @@
           <p:cNvPr id="2" name="Text Placeholder 1">
             <a:extLst>
               <a:ext uri="{FF2B5EF4-FFF2-40B4-BE49-F238E27FC236}">
+                <a16:creationId xmlns:a16="http://schemas.microsoft.com/office/drawing/2014/main" id="{1BF58D61-D951-4047-914F-96A26849E50A}"/>
+              </a:ext>
+            </a:extLst>
+          </p:cNvPr>
+          <p:cNvSpPr>
+            <a:spLocks noGrp="1"/>
+          </p:cNvSpPr>
+          <p:nvPr>
+            <p:ph type="body" idx="1"/>
+          </p:nvPr>
+        </p:nvSpPr>
+        <p:spPr/>
+        <p:txBody>
+          <a:bodyPr/>
+          <a:lstStyle/>
+          <a:p>
+            <a:r>
+              <a:rPr lang="en-US" dirty="0"/>
+              <a:t>Every entity that exists?</a:t>
+            </a:r>
+            <a:br>
+              <a:rPr lang="en-US" dirty="0"/>
+            </a:br>
+            <a:endParaRPr lang="en-US" dirty="0"/>
+          </a:p>
+          <a:p>
+            <a:r>
+              <a:rPr lang="en-US" dirty="0"/>
+              <a:t>“Active” entities?</a:t>
+            </a:r>
+            <a:br>
+              <a:rPr lang="en-US" dirty="0"/>
+            </a:br>
+            <a:endParaRPr lang="en-US" dirty="0"/>
+          </a:p>
+          <a:p>
+            <a:r>
+              <a:rPr lang="en-US" dirty="0"/>
+              <a:t>Event-based?</a:t>
+            </a:r>
+          </a:p>
+          <a:p>
+            <a:pPr lvl="1"/>
+            <a:r>
+              <a:rPr lang="en-US" dirty="0"/>
+              <a:t>Making predictions when the events occur?</a:t>
+            </a:r>
+          </a:p>
+          <a:p>
+            <a:pPr lvl="1"/>
+            <a:r>
+              <a:rPr lang="en-US" dirty="0"/>
+              <a:t>All entities that have had an event in a certain time window?</a:t>
+            </a:r>
+          </a:p>
+        </p:txBody>
+      </p:sp>
+      <p:sp>
+        <p:nvSpPr>
+          <p:cNvPr id="3" name="Title 2">
+            <a:extLst>
+              <a:ext uri="{FF2B5EF4-FFF2-40B4-BE49-F238E27FC236}">
+                <a16:creationId xmlns:a16="http://schemas.microsoft.com/office/drawing/2014/main" id="{18E00A3A-9C26-1B42-A62C-4DB46B741290}"/>
+              </a:ext>
+            </a:extLst>
+          </p:cNvPr>
+          <p:cNvSpPr>
+            <a:spLocks noGrp="1"/>
+          </p:cNvSpPr>
+          <p:nvPr>
+            <p:ph type="title"/>
+          </p:nvPr>
+        </p:nvSpPr>
+        <p:spPr/>
+        <p:txBody>
+          <a:bodyPr/>
+          <a:lstStyle/>
+          <a:p>
+            <a:r>
+              <a:rPr lang="en-US" dirty="0"/>
+              <a:t>Decisions we need to make: cohort definition</a:t>
+            </a:r>
+          </a:p>
+        </p:txBody>
+      </p:sp>
+    </p:spTree>
+    <p:extLst>
+      <p:ext uri="{BB962C8B-B14F-4D97-AF65-F5344CB8AC3E}">
+        <p14:creationId xmlns:p14="http://schemas.microsoft.com/office/powerpoint/2010/main" val="3823067349"/>
+      </p:ext>
+    </p:extLst>
+  </p:cSld>
+  <p:clrMapOvr>
+    <a:masterClrMapping/>
+  </p:clrMapOvr>
+</p:sld>
+</file>
+
+<file path=ppt/slides/slide6.xml><?xml version="1.0" encoding="utf-8"?>
+<p:sld xmlns:a="http://schemas.openxmlformats.org/drawingml/2006/main" xmlns:r="http://schemas.openxmlformats.org/officeDocument/2006/relationships" xmlns:p="http://schemas.openxmlformats.org/presentationml/2006/main">
+  <p:cSld>
+    <p:spTree>
+      <p:nvGrpSpPr>
+        <p:cNvPr id="1" name=""/>
+        <p:cNvGrpSpPr/>
+        <p:nvPr/>
+      </p:nvGrpSpPr>
+      <p:grpSpPr>
+        <a:xfrm>
+          <a:off x="0" y="0"/>
+          <a:ext cx="0" cy="0"/>
+          <a:chOff x="0" y="0"/>
+          <a:chExt cx="0" cy="0"/>
+        </a:xfrm>
+      </p:grpSpPr>
+      <p:sp>
+        <p:nvSpPr>
+          <p:cNvPr id="2" name="Text Placeholder 1">
+            <a:extLst>
+              <a:ext uri="{FF2B5EF4-FFF2-40B4-BE49-F238E27FC236}">
                 <a16:creationId xmlns:a16="http://schemas.microsoft.com/office/drawing/2014/main" id="{853D6B69-44D2-D449-B9CE-63D5E2BFE8A0}"/>
               </a:ext>
             </a:extLst>
@@ -4138,7 +4386,7 @@
           <a:p>
             <a:r>
               <a:rPr lang="en-US" dirty="0"/>
-              <a:t>Additional Decisions</a:t>
+              <a:t>Analytical Formulation Examples</a:t>
             </a:r>
           </a:p>
         </p:txBody>
@@ -4156,7 +4404,110 @@
 </p:sld>
 </file>
 
-<file path=ppt/slides/slide6.xml><?xml version="1.0" encoding="utf-8"?>
+<file path=ppt/slides/slide7.xml><?xml version="1.0" encoding="utf-8"?>
+<p:sld xmlns:a="http://schemas.openxmlformats.org/drawingml/2006/main" xmlns:r="http://schemas.openxmlformats.org/officeDocument/2006/relationships" xmlns:p="http://schemas.openxmlformats.org/presentationml/2006/main">
+  <p:cSld>
+    <p:spTree>
+      <p:nvGrpSpPr>
+        <p:cNvPr id="1" name=""/>
+        <p:cNvGrpSpPr/>
+        <p:nvPr/>
+      </p:nvGrpSpPr>
+      <p:grpSpPr>
+        <a:xfrm>
+          <a:off x="0" y="0"/>
+          <a:ext cx="0" cy="0"/>
+          <a:chOff x="0" y="0"/>
+          <a:chExt cx="0" cy="0"/>
+        </a:xfrm>
+      </p:grpSpPr>
+      <p:sp>
+        <p:nvSpPr>
+          <p:cNvPr id="2" name="Text Placeholder 1">
+            <a:extLst>
+              <a:ext uri="{FF2B5EF4-FFF2-40B4-BE49-F238E27FC236}">
+                <a16:creationId xmlns:a16="http://schemas.microsoft.com/office/drawing/2014/main" id="{16F0CF04-B42B-C044-ACCB-6C665E5B57C0}"/>
+              </a:ext>
+            </a:extLst>
+          </p:cNvPr>
+          <p:cNvSpPr>
+            <a:spLocks noGrp="1"/>
+          </p:cNvSpPr>
+          <p:nvPr>
+            <p:ph type="body" idx="1"/>
+          </p:nvPr>
+        </p:nvSpPr>
+        <p:spPr>
+          <a:xfrm>
+            <a:off x="268210" y="2360141"/>
+            <a:ext cx="11666400" cy="4182862"/>
+          </a:xfrm>
+        </p:spPr>
+        <p:txBody>
+          <a:bodyPr/>
+          <a:lstStyle/>
+          <a:p>
+            <a:pPr marL="114300" indent="0" algn="ctr">
+              <a:buNone/>
+            </a:pPr>
+            <a:r>
+              <a:rPr lang="en-US" sz="4800" dirty="0"/>
+              <a:t>What is the appropriate comparison </a:t>
+            </a:r>
+          </a:p>
+          <a:p>
+            <a:pPr marL="114300" indent="0" algn="ctr">
+              <a:buNone/>
+            </a:pPr>
+            <a:r>
+              <a:rPr lang="en-US" sz="4800" dirty="0"/>
+              <a:t>for your ML model?</a:t>
+            </a:r>
+          </a:p>
+        </p:txBody>
+      </p:sp>
+      <p:sp>
+        <p:nvSpPr>
+          <p:cNvPr id="3" name="Title 2">
+            <a:extLst>
+              <a:ext uri="{FF2B5EF4-FFF2-40B4-BE49-F238E27FC236}">
+                <a16:creationId xmlns:a16="http://schemas.microsoft.com/office/drawing/2014/main" id="{FC049B21-A440-624B-941A-2CE526530E5B}"/>
+              </a:ext>
+            </a:extLst>
+          </p:cNvPr>
+          <p:cNvSpPr>
+            <a:spLocks noGrp="1"/>
+          </p:cNvSpPr>
+          <p:nvPr>
+            <p:ph type="title"/>
+          </p:nvPr>
+        </p:nvSpPr>
+        <p:spPr/>
+        <p:txBody>
+          <a:bodyPr/>
+          <a:lstStyle/>
+          <a:p>
+            <a:r>
+              <a:rPr lang="en-US" dirty="0"/>
+              <a:t>Baselines</a:t>
+            </a:r>
+          </a:p>
+        </p:txBody>
+      </p:sp>
+    </p:spTree>
+    <p:extLst>
+      <p:ext uri="{BB962C8B-B14F-4D97-AF65-F5344CB8AC3E}">
+        <p14:creationId xmlns:p14="http://schemas.microsoft.com/office/powerpoint/2010/main" val="1335110213"/>
+      </p:ext>
+    </p:extLst>
+  </p:cSld>
+  <p:clrMapOvr>
+    <a:masterClrMapping/>
+  </p:clrMapOvr>
+</p:sld>
+</file>
+
+<file path=ppt/slides/slide8.xml><?xml version="1.0" encoding="utf-8"?>
 <p:sld xmlns:a="http://schemas.openxmlformats.org/drawingml/2006/main" xmlns:r="http://schemas.openxmlformats.org/officeDocument/2006/relationships" xmlns:p="http://schemas.openxmlformats.org/presentationml/2006/main">
   <p:cSld>
     <p:spTree>
@@ -4196,34 +4547,44 @@
           <a:p>
             <a:r>
               <a:rPr lang="en-US" dirty="0"/>
-              <a:t>Random</a:t>
-            </a:r>
-          </a:p>
-          <a:p>
-            <a:r>
-              <a:rPr lang="en-US" dirty="0"/>
               <a:t>Common Sense</a:t>
             </a:r>
+            <a:br>
+              <a:rPr lang="en-US" dirty="0"/>
+            </a:br>
+            <a:endParaRPr lang="en-US" dirty="0"/>
           </a:p>
           <a:p>
             <a:r>
               <a:rPr lang="en-US" dirty="0"/>
               <a:t>What they do today</a:t>
             </a:r>
+            <a:br>
+              <a:rPr lang="en-US" dirty="0"/>
+            </a:br>
+            <a:endParaRPr lang="en-US" dirty="0"/>
           </a:p>
           <a:p>
             <a:r>
               <a:rPr lang="en-US" dirty="0"/>
               <a:t>What they could do today easily</a:t>
             </a:r>
-          </a:p>
-          <a:p>
+            <a:br>
+              <a:rPr lang="en-US" dirty="0"/>
+            </a:br>
             <a:endParaRPr lang="en-US" dirty="0"/>
           </a:p>
           <a:p>
             <a:r>
               <a:rPr lang="en-US" dirty="0"/>
-              <a:t>How much better than baselines does our system need to be in order to deploy?	</a:t>
+              <a:t>Prior/Base Rate</a:t>
+            </a:r>
+          </a:p>
+          <a:p>
+            <a:pPr lvl="1"/>
+            <a:r>
+              <a:rPr lang="en-US" dirty="0"/>
+              <a:t>What expected value would you get if you just choose at random?</a:t>
             </a:r>
           </a:p>
         </p:txBody>
@@ -4251,7 +4612,7 @@
           <a:p>
             <a:r>
               <a:rPr lang="en-US" dirty="0"/>
-              <a:t>Baselines</a:t>
+              <a:t>Baseline Options</a:t>
             </a:r>
           </a:p>
         </p:txBody>
@@ -4259,7 +4620,130 @@
     </p:spTree>
     <p:extLst>
       <p:ext uri="{BB962C8B-B14F-4D97-AF65-F5344CB8AC3E}">
-        <p14:creationId xmlns:p14="http://schemas.microsoft.com/office/powerpoint/2010/main" val="1335110213"/>
+        <p14:creationId xmlns:p14="http://schemas.microsoft.com/office/powerpoint/2010/main" val="225707519"/>
+      </p:ext>
+    </p:extLst>
+  </p:cSld>
+  <p:clrMapOvr>
+    <a:masterClrMapping/>
+  </p:clrMapOvr>
+</p:sld>
+</file>
+
+<file path=ppt/slides/slide9.xml><?xml version="1.0" encoding="utf-8"?>
+<p:sld xmlns:a="http://schemas.openxmlformats.org/drawingml/2006/main" xmlns:r="http://schemas.openxmlformats.org/officeDocument/2006/relationships" xmlns:p="http://schemas.openxmlformats.org/presentationml/2006/main">
+  <p:cSld>
+    <p:spTree>
+      <p:nvGrpSpPr>
+        <p:cNvPr id="1" name=""/>
+        <p:cNvGrpSpPr/>
+        <p:nvPr/>
+      </p:nvGrpSpPr>
+      <p:grpSpPr>
+        <a:xfrm>
+          <a:off x="0" y="0"/>
+          <a:ext cx="0" cy="0"/>
+          <a:chOff x="0" y="0"/>
+          <a:chExt cx="0" cy="0"/>
+        </a:xfrm>
+      </p:grpSpPr>
+      <p:sp>
+        <p:nvSpPr>
+          <p:cNvPr id="2" name="Text Placeholder 1">
+            <a:extLst>
+              <a:ext uri="{FF2B5EF4-FFF2-40B4-BE49-F238E27FC236}">
+                <a16:creationId xmlns:a16="http://schemas.microsoft.com/office/drawing/2014/main" id="{16F0CF04-B42B-C044-ACCB-6C665E5B57C0}"/>
+              </a:ext>
+            </a:extLst>
+          </p:cNvPr>
+          <p:cNvSpPr>
+            <a:spLocks noGrp="1"/>
+          </p:cNvSpPr>
+          <p:nvPr>
+            <p:ph type="body" idx="1"/>
+          </p:nvPr>
+        </p:nvSpPr>
+        <p:spPr/>
+        <p:txBody>
+          <a:bodyPr/>
+          <a:lstStyle/>
+          <a:p>
+            <a:r>
+              <a:rPr lang="en-US" dirty="0"/>
+              <a:t>How much better than baselines does our system need to be in order to deploy?</a:t>
+            </a:r>
+            <a:br>
+              <a:rPr lang="en-US" dirty="0"/>
+            </a:br>
+            <a:endParaRPr lang="en-US" dirty="0"/>
+          </a:p>
+          <a:p>
+            <a:r>
+              <a:rPr lang="en-US" dirty="0"/>
+              <a:t>Important to compare performance against the base rate/prior, but rarely a “common sense” baseline</a:t>
+            </a:r>
+            <a:br>
+              <a:rPr lang="en-US" dirty="0"/>
+            </a:br>
+            <a:endParaRPr lang="en-US" dirty="0"/>
+          </a:p>
+          <a:p>
+            <a:r>
+              <a:rPr lang="en-US" dirty="0"/>
+              <a:t>Good baselines should provide an ordering to sort the entities</a:t>
+            </a:r>
+          </a:p>
+          <a:p>
+            <a:pPr lvl="1"/>
+            <a:r>
+              <a:rPr lang="en-US" dirty="0"/>
+              <a:t>Heuristic rules (or shallow decision trees) might reflect current practice, but can yield a small number of unique scores with lots of ties</a:t>
+            </a:r>
+            <a:br>
+              <a:rPr lang="en-US" dirty="0"/>
+            </a:br>
+            <a:endParaRPr lang="en-US" dirty="0"/>
+          </a:p>
+          <a:p>
+            <a:r>
+              <a:rPr lang="en-US" dirty="0"/>
+              <a:t>In may real world problems, a good baseline can be difficult to beat</a:t>
+            </a:r>
+          </a:p>
+        </p:txBody>
+      </p:sp>
+      <p:sp>
+        <p:nvSpPr>
+          <p:cNvPr id="3" name="Title 2">
+            <a:extLst>
+              <a:ext uri="{FF2B5EF4-FFF2-40B4-BE49-F238E27FC236}">
+                <a16:creationId xmlns:a16="http://schemas.microsoft.com/office/drawing/2014/main" id="{FC049B21-A440-624B-941A-2CE526530E5B}"/>
+              </a:ext>
+            </a:extLst>
+          </p:cNvPr>
+          <p:cNvSpPr>
+            <a:spLocks noGrp="1"/>
+          </p:cNvSpPr>
+          <p:nvPr>
+            <p:ph type="title"/>
+          </p:nvPr>
+        </p:nvSpPr>
+        <p:spPr/>
+        <p:txBody>
+          <a:bodyPr/>
+          <a:lstStyle/>
+          <a:p>
+            <a:r>
+              <a:rPr lang="en-US" dirty="0"/>
+              <a:t>Baseline Considerations</a:t>
+            </a:r>
+          </a:p>
+        </p:txBody>
+      </p:sp>
+    </p:spTree>
+    <p:extLst>
+      <p:ext uri="{BB962C8B-B14F-4D97-AF65-F5344CB8AC3E}">
+        <p14:creationId xmlns:p14="http://schemas.microsoft.com/office/powerpoint/2010/main" val="3480883044"/>
       </p:ext>
     </p:extLst>
   </p:cSld>

</xml_diff>